<commit_message>
added figs and technical architecture discussinon
</commit_message>
<xml_diff>
--- a/content/figs/Figure 3 - institution storage.pptx
+++ b/content/figs/Figure 3 - institution storage.pptx
@@ -243,7 +243,7 @@
           <a:p>
             <a:fld id="{22C3E212-2C41-F94A-B51C-8413AE2E7502}" type="datetimeFigureOut">
               <a:rPr lang="en-US" smtClean="0"/>
-              <a:t>2/4/18</a:t>
+              <a:t>2/5/18</a:t>
             </a:fld>
             <a:endParaRPr lang="en-US"/>
           </a:p>
@@ -413,7 +413,7 @@
           <a:p>
             <a:fld id="{22C3E212-2C41-F94A-B51C-8413AE2E7502}" type="datetimeFigureOut">
               <a:rPr lang="en-US" smtClean="0"/>
-              <a:t>2/4/18</a:t>
+              <a:t>2/5/18</a:t>
             </a:fld>
             <a:endParaRPr lang="en-US"/>
           </a:p>
@@ -593,7 +593,7 @@
           <a:p>
             <a:fld id="{22C3E212-2C41-F94A-B51C-8413AE2E7502}" type="datetimeFigureOut">
               <a:rPr lang="en-US" smtClean="0"/>
-              <a:t>2/4/18</a:t>
+              <a:t>2/5/18</a:t>
             </a:fld>
             <a:endParaRPr lang="en-US"/>
           </a:p>
@@ -763,7 +763,7 @@
           <a:p>
             <a:fld id="{22C3E212-2C41-F94A-B51C-8413AE2E7502}" type="datetimeFigureOut">
               <a:rPr lang="en-US" smtClean="0"/>
-              <a:t>2/4/18</a:t>
+              <a:t>2/5/18</a:t>
             </a:fld>
             <a:endParaRPr lang="en-US"/>
           </a:p>
@@ -1009,7 +1009,7 @@
           <a:p>
             <a:fld id="{22C3E212-2C41-F94A-B51C-8413AE2E7502}" type="datetimeFigureOut">
               <a:rPr lang="en-US" smtClean="0"/>
-              <a:t>2/4/18</a:t>
+              <a:t>2/5/18</a:t>
             </a:fld>
             <a:endParaRPr lang="en-US"/>
           </a:p>
@@ -1241,7 +1241,7 @@
           <a:p>
             <a:fld id="{22C3E212-2C41-F94A-B51C-8413AE2E7502}" type="datetimeFigureOut">
               <a:rPr lang="en-US" smtClean="0"/>
-              <a:t>2/4/18</a:t>
+              <a:t>2/5/18</a:t>
             </a:fld>
             <a:endParaRPr lang="en-US"/>
           </a:p>
@@ -1608,7 +1608,7 @@
           <a:p>
             <a:fld id="{22C3E212-2C41-F94A-B51C-8413AE2E7502}" type="datetimeFigureOut">
               <a:rPr lang="en-US" smtClean="0"/>
-              <a:t>2/4/18</a:t>
+              <a:t>2/5/18</a:t>
             </a:fld>
             <a:endParaRPr lang="en-US"/>
           </a:p>
@@ -1726,7 +1726,7 @@
           <a:p>
             <a:fld id="{22C3E212-2C41-F94A-B51C-8413AE2E7502}" type="datetimeFigureOut">
               <a:rPr lang="en-US" smtClean="0"/>
-              <a:t>2/4/18</a:t>
+              <a:t>2/5/18</a:t>
             </a:fld>
             <a:endParaRPr lang="en-US"/>
           </a:p>
@@ -1821,7 +1821,7 @@
           <a:p>
             <a:fld id="{22C3E212-2C41-F94A-B51C-8413AE2E7502}" type="datetimeFigureOut">
               <a:rPr lang="en-US" smtClean="0"/>
-              <a:t>2/4/18</a:t>
+              <a:t>2/5/18</a:t>
             </a:fld>
             <a:endParaRPr lang="en-US"/>
           </a:p>
@@ -2098,7 +2098,7 @@
           <a:p>
             <a:fld id="{22C3E212-2C41-F94A-B51C-8413AE2E7502}" type="datetimeFigureOut">
               <a:rPr lang="en-US" smtClean="0"/>
-              <a:t>2/4/18</a:t>
+              <a:t>2/5/18</a:t>
             </a:fld>
             <a:endParaRPr lang="en-US"/>
           </a:p>
@@ -2351,7 +2351,7 @@
           <a:p>
             <a:fld id="{22C3E212-2C41-F94A-B51C-8413AE2E7502}" type="datetimeFigureOut">
               <a:rPr lang="en-US" smtClean="0"/>
-              <a:t>2/4/18</a:t>
+              <a:t>2/5/18</a:t>
             </a:fld>
             <a:endParaRPr lang="en-US"/>
           </a:p>
@@ -2564,7 +2564,7 @@
           <a:p>
             <a:fld id="{22C3E212-2C41-F94A-B51C-8413AE2E7502}" type="datetimeFigureOut">
               <a:rPr lang="en-US" smtClean="0"/>
-              <a:t>2/4/18</a:t>
+              <a:t>2/5/18</a:t>
             </a:fld>
             <a:endParaRPr lang="en-US"/>
           </a:p>
@@ -2977,7 +2977,7 @@
         </p:nvSpPr>
         <p:spPr>
           <a:xfrm>
-            <a:off x="870857" y="228600"/>
+            <a:off x="799420" y="228596"/>
             <a:ext cx="10776857" cy="6346371"/>
           </a:xfrm>
           <a:prstGeom prst="rect">
@@ -3014,87 +3014,6 @@
           <a:p>
             <a:pPr algn="ctr"/>
             <a:endParaRPr lang="en-US"/>
-          </a:p>
-        </p:txBody>
-      </p:sp>
-      <p:sp>
-        <p:nvSpPr>
-          <p:cNvPr id="12" name="Rectangle 11"/>
-          <p:cNvSpPr/>
-          <p:nvPr/>
-        </p:nvSpPr>
-        <p:spPr>
-          <a:xfrm>
-            <a:off x="6005855" y="1899553"/>
-            <a:ext cx="1741714" cy="1317171"/>
-          </a:xfrm>
-          <a:prstGeom prst="rect">
-            <a:avLst/>
-          </a:prstGeom>
-          <a:gradFill>
-            <a:gsLst>
-              <a:gs pos="0">
-                <a:schemeClr val="accent1">
-                  <a:lumMod val="5000"/>
-                  <a:lumOff val="95000"/>
-                </a:schemeClr>
-              </a:gs>
-              <a:gs pos="74000">
-                <a:schemeClr val="accent1">
-                  <a:lumMod val="45000"/>
-                  <a:lumOff val="55000"/>
-                </a:schemeClr>
-              </a:gs>
-              <a:gs pos="83000">
-                <a:schemeClr val="accent1">
-                  <a:lumMod val="45000"/>
-                  <a:lumOff val="55000"/>
-                </a:schemeClr>
-              </a:gs>
-              <a:gs pos="100000">
-                <a:schemeClr val="accent1">
-                  <a:lumMod val="30000"/>
-                  <a:lumOff val="70000"/>
-                </a:schemeClr>
-              </a:gs>
-            </a:gsLst>
-            <a:lin ang="5400000" scaled="1"/>
-          </a:gradFill>
-        </p:spPr>
-        <p:style>
-          <a:lnRef idx="2">
-            <a:schemeClr val="accent1">
-              <a:shade val="50000"/>
-            </a:schemeClr>
-          </a:lnRef>
-          <a:fillRef idx="1">
-            <a:schemeClr val="accent1"/>
-          </a:fillRef>
-          <a:effectRef idx="0">
-            <a:schemeClr val="accent1"/>
-          </a:effectRef>
-          <a:fontRef idx="minor">
-            <a:schemeClr val="lt1"/>
-          </a:fontRef>
-        </p:style>
-        <p:txBody>
-          <a:bodyPr rtlCol="0" anchor="ctr"/>
-          <a:lstStyle/>
-          <a:p>
-            <a:pPr algn="ctr"/>
-            <a:r>
-              <a:rPr lang="en-US" sz="1400" dirty="0" smtClean="0">
-                <a:solidFill>
-                  <a:schemeClr val="tx1"/>
-                </a:solidFill>
-              </a:rPr>
-              <a:t>MightMooC</a:t>
-            </a:r>
-            <a:endParaRPr lang="en-US" sz="1400" dirty="0">
-              <a:solidFill>
-                <a:schemeClr val="tx1"/>
-              </a:solidFill>
-            </a:endParaRPr>
           </a:p>
         </p:txBody>
       </p:sp>
@@ -3208,46 +3127,6 @@
       </p:sp>
       <p:sp>
         <p:nvSpPr>
-          <p:cNvPr id="32" name="Can 31"/>
-          <p:cNvSpPr/>
-          <p:nvPr/>
-        </p:nvSpPr>
-        <p:spPr>
-          <a:xfrm>
-            <a:off x="9694416" y="925286"/>
-            <a:ext cx="1328056" cy="631371"/>
-          </a:xfrm>
-          <a:prstGeom prst="can">
-            <a:avLst/>
-          </a:prstGeom>
-        </p:spPr>
-        <p:style>
-          <a:lnRef idx="2">
-            <a:schemeClr val="accent1">
-              <a:shade val="50000"/>
-            </a:schemeClr>
-          </a:lnRef>
-          <a:fillRef idx="1">
-            <a:schemeClr val="accent1"/>
-          </a:fillRef>
-          <a:effectRef idx="0">
-            <a:schemeClr val="accent1"/>
-          </a:effectRef>
-          <a:fontRef idx="minor">
-            <a:schemeClr val="lt1"/>
-          </a:fontRef>
-        </p:style>
-        <p:txBody>
-          <a:bodyPr rtlCol="0" anchor="ctr"/>
-          <a:lstStyle/>
-          <a:p>
-            <a:pPr algn="ctr"/>
-            <a:endParaRPr lang="en-US"/>
-          </a:p>
-        </p:txBody>
-      </p:sp>
-      <p:sp>
-        <p:nvSpPr>
           <p:cNvPr id="35" name="Rectangle 34"/>
           <p:cNvSpPr/>
           <p:nvPr/>
@@ -3356,46 +3235,6 @@
       </p:sp>
       <p:sp>
         <p:nvSpPr>
-          <p:cNvPr id="36" name="Can 35"/>
-          <p:cNvSpPr/>
-          <p:nvPr/>
-        </p:nvSpPr>
-        <p:spPr>
-          <a:xfrm>
-            <a:off x="9694416" y="2460170"/>
-            <a:ext cx="1328056" cy="631371"/>
-          </a:xfrm>
-          <a:prstGeom prst="can">
-            <a:avLst/>
-          </a:prstGeom>
-        </p:spPr>
-        <p:style>
-          <a:lnRef idx="2">
-            <a:schemeClr val="accent1">
-              <a:shade val="50000"/>
-            </a:schemeClr>
-          </a:lnRef>
-          <a:fillRef idx="1">
-            <a:schemeClr val="accent1"/>
-          </a:fillRef>
-          <a:effectRef idx="0">
-            <a:schemeClr val="accent1"/>
-          </a:effectRef>
-          <a:fontRef idx="minor">
-            <a:schemeClr val="lt1"/>
-          </a:fontRef>
-        </p:style>
-        <p:txBody>
-          <a:bodyPr rtlCol="0" anchor="ctr"/>
-          <a:lstStyle/>
-          <a:p>
-            <a:pPr algn="ctr"/>
-            <a:endParaRPr lang="en-US"/>
-          </a:p>
-        </p:txBody>
-      </p:sp>
-      <p:sp>
-        <p:nvSpPr>
           <p:cNvPr id="37" name="Rectangle 36"/>
           <p:cNvSpPr/>
           <p:nvPr/>
@@ -3509,53 +3348,13 @@
       </p:sp>
       <p:sp>
         <p:nvSpPr>
-          <p:cNvPr id="38" name="Can 37"/>
-          <p:cNvSpPr/>
-          <p:nvPr/>
-        </p:nvSpPr>
-        <p:spPr>
-          <a:xfrm>
-            <a:off x="9694416" y="3935185"/>
-            <a:ext cx="1328056" cy="631371"/>
-          </a:xfrm>
-          <a:prstGeom prst="can">
-            <a:avLst/>
-          </a:prstGeom>
-        </p:spPr>
-        <p:style>
-          <a:lnRef idx="2">
-            <a:schemeClr val="accent1">
-              <a:shade val="50000"/>
-            </a:schemeClr>
-          </a:lnRef>
-          <a:fillRef idx="1">
-            <a:schemeClr val="accent1"/>
-          </a:fillRef>
-          <a:effectRef idx="0">
-            <a:schemeClr val="accent1"/>
-          </a:effectRef>
-          <a:fontRef idx="minor">
-            <a:schemeClr val="lt1"/>
-          </a:fontRef>
-        </p:style>
-        <p:txBody>
-          <a:bodyPr rtlCol="0" anchor="ctr"/>
-          <a:lstStyle/>
-          <a:p>
-            <a:pPr algn="ctr"/>
-            <a:endParaRPr lang="en-US"/>
-          </a:p>
-        </p:txBody>
-      </p:sp>
-      <p:sp>
-        <p:nvSpPr>
           <p:cNvPr id="39" name="Rectangle 38"/>
           <p:cNvSpPr/>
           <p:nvPr/>
         </p:nvSpPr>
         <p:spPr>
           <a:xfrm>
-            <a:off x="2503715" y="1899553"/>
+            <a:off x="1463190" y="1935325"/>
             <a:ext cx="1741714" cy="1317171"/>
           </a:xfrm>
           <a:prstGeom prst="rect">
@@ -3751,14 +3550,190 @@
       </p:sp>
       <p:sp>
         <p:nvSpPr>
-          <p:cNvPr id="54" name="Can 53"/>
+          <p:cNvPr id="9" name="Rectangle 8"/>
           <p:cNvSpPr/>
           <p:nvPr/>
         </p:nvSpPr>
         <p:spPr>
           <a:xfrm>
-            <a:off x="9714824" y="5500009"/>
-            <a:ext cx="1328056" cy="631371"/>
+            <a:off x="9729788" y="1104900"/>
+            <a:ext cx="1357312" cy="538163"/>
+          </a:xfrm>
+          <a:prstGeom prst="rect">
+            <a:avLst/>
+          </a:prstGeom>
+        </p:spPr>
+        <p:style>
+          <a:lnRef idx="2">
+            <a:schemeClr val="accent1">
+              <a:shade val="50000"/>
+            </a:schemeClr>
+          </a:lnRef>
+          <a:fillRef idx="1">
+            <a:schemeClr val="accent1"/>
+          </a:fillRef>
+          <a:effectRef idx="0">
+            <a:schemeClr val="accent1"/>
+          </a:effectRef>
+          <a:fontRef idx="minor">
+            <a:schemeClr val="lt1"/>
+          </a:fontRef>
+        </p:style>
+        <p:txBody>
+          <a:bodyPr rtlCol="0" anchor="ctr"/>
+          <a:lstStyle/>
+          <a:p>
+            <a:pPr algn="ctr"/>
+            <a:r>
+              <a:rPr lang="en-US" dirty="0" smtClean="0"/>
+              <a:t>Client</a:t>
+            </a:r>
+            <a:endParaRPr lang="en-US" dirty="0"/>
+          </a:p>
+        </p:txBody>
+      </p:sp>
+      <p:sp>
+        <p:nvSpPr>
+          <p:cNvPr id="33" name="Rectangle 32"/>
+          <p:cNvSpPr/>
+          <p:nvPr/>
+        </p:nvSpPr>
+        <p:spPr>
+          <a:xfrm>
+            <a:off x="9683160" y="2575493"/>
+            <a:ext cx="1357312" cy="538163"/>
+          </a:xfrm>
+          <a:prstGeom prst="rect">
+            <a:avLst/>
+          </a:prstGeom>
+        </p:spPr>
+        <p:style>
+          <a:lnRef idx="2">
+            <a:schemeClr val="accent1">
+              <a:shade val="50000"/>
+            </a:schemeClr>
+          </a:lnRef>
+          <a:fillRef idx="1">
+            <a:schemeClr val="accent1"/>
+          </a:fillRef>
+          <a:effectRef idx="0">
+            <a:schemeClr val="accent1"/>
+          </a:effectRef>
+          <a:fontRef idx="minor">
+            <a:schemeClr val="lt1"/>
+          </a:fontRef>
+        </p:style>
+        <p:txBody>
+          <a:bodyPr rtlCol="0" anchor="ctr"/>
+          <a:lstStyle/>
+          <a:p>
+            <a:pPr algn="ctr"/>
+            <a:r>
+              <a:rPr lang="en-US" dirty="0" smtClean="0"/>
+              <a:t>Client</a:t>
+            </a:r>
+            <a:endParaRPr lang="en-US" dirty="0"/>
+          </a:p>
+        </p:txBody>
+      </p:sp>
+      <p:sp>
+        <p:nvSpPr>
+          <p:cNvPr id="34" name="Rectangle 33"/>
+          <p:cNvSpPr/>
+          <p:nvPr/>
+        </p:nvSpPr>
+        <p:spPr>
+          <a:xfrm>
+            <a:off x="9729788" y="4060367"/>
+            <a:ext cx="1357312" cy="538163"/>
+          </a:xfrm>
+          <a:prstGeom prst="rect">
+            <a:avLst/>
+          </a:prstGeom>
+        </p:spPr>
+        <p:style>
+          <a:lnRef idx="2">
+            <a:schemeClr val="accent1">
+              <a:shade val="50000"/>
+            </a:schemeClr>
+          </a:lnRef>
+          <a:fillRef idx="1">
+            <a:schemeClr val="accent1"/>
+          </a:fillRef>
+          <a:effectRef idx="0">
+            <a:schemeClr val="accent1"/>
+          </a:effectRef>
+          <a:fontRef idx="minor">
+            <a:schemeClr val="lt1"/>
+          </a:fontRef>
+        </p:style>
+        <p:txBody>
+          <a:bodyPr rtlCol="0" anchor="ctr"/>
+          <a:lstStyle/>
+          <a:p>
+            <a:pPr algn="ctr"/>
+            <a:r>
+              <a:rPr lang="en-US" dirty="0" smtClean="0"/>
+              <a:t>Client</a:t>
+            </a:r>
+            <a:endParaRPr lang="en-US" dirty="0"/>
+          </a:p>
+        </p:txBody>
+      </p:sp>
+      <p:sp>
+        <p:nvSpPr>
+          <p:cNvPr id="40" name="Rectangle 39"/>
+          <p:cNvSpPr/>
+          <p:nvPr/>
+        </p:nvSpPr>
+        <p:spPr>
+          <a:xfrm>
+            <a:off x="9729788" y="5612264"/>
+            <a:ext cx="1357312" cy="538163"/>
+          </a:xfrm>
+          <a:prstGeom prst="rect">
+            <a:avLst/>
+          </a:prstGeom>
+        </p:spPr>
+        <p:style>
+          <a:lnRef idx="2">
+            <a:schemeClr val="accent1">
+              <a:shade val="50000"/>
+            </a:schemeClr>
+          </a:lnRef>
+          <a:fillRef idx="1">
+            <a:schemeClr val="accent1"/>
+          </a:fillRef>
+          <a:effectRef idx="0">
+            <a:schemeClr val="accent1"/>
+          </a:effectRef>
+          <a:fontRef idx="minor">
+            <a:schemeClr val="lt1"/>
+          </a:fontRef>
+        </p:style>
+        <p:txBody>
+          <a:bodyPr rtlCol="0" anchor="ctr"/>
+          <a:lstStyle/>
+          <a:p>
+            <a:pPr algn="ctr"/>
+            <a:r>
+              <a:rPr lang="en-US" dirty="0" smtClean="0"/>
+              <a:t>Client</a:t>
+            </a:r>
+            <a:endParaRPr lang="en-US" dirty="0"/>
+          </a:p>
+        </p:txBody>
+      </p:sp>
+      <p:sp>
+        <p:nvSpPr>
+          <p:cNvPr id="10" name="Can 9"/>
+          <p:cNvSpPr/>
+          <p:nvPr/>
+        </p:nvSpPr>
+        <p:spPr>
+          <a:xfrm>
+            <a:off x="4367093" y="4034174"/>
+            <a:ext cx="914400" cy="1128712"/>
           </a:xfrm>
           <a:prstGeom prst="can">
             <a:avLst/>
@@ -3791,461 +3766,93 @@
       </p:sp>
       <p:sp>
         <p:nvSpPr>
-          <p:cNvPr id="59" name="TextBox 58"/>
-          <p:cNvSpPr txBox="1"/>
+          <p:cNvPr id="41" name="Rectangle 40"/>
+          <p:cNvSpPr/>
           <p:nvPr/>
         </p:nvSpPr>
         <p:spPr>
           <a:xfrm>
-            <a:off x="1080846" y="4845085"/>
-            <a:ext cx="7159640" cy="1477328"/>
+            <a:off x="6643628" y="1935325"/>
+            <a:ext cx="1741714" cy="1317171"/>
           </a:xfrm>
           <a:prstGeom prst="rect">
             <a:avLst/>
           </a:prstGeom>
-          <a:noFill/>
-        </p:spPr>
-        <p:txBody>
-          <a:bodyPr wrap="square" rtlCol="0">
-            <a:spAutoFit/>
-          </a:bodyPr>
-          <a:lstStyle/>
-          <a:p>
-            <a:pPr marL="342900" indent="-342900">
-              <a:buFont typeface="+mj-lt"/>
-              <a:buAutoNum type="arabicPeriod"/>
-            </a:pPr>
-            <a:r>
-              <a:rPr lang="en-US" dirty="0" smtClean="0"/>
-              <a:t>Client request to GET All courses about subject ‘x’ </a:t>
-            </a:r>
-          </a:p>
-          <a:p>
-            <a:pPr marL="342900" indent="-342900">
-              <a:buFont typeface="+mj-lt"/>
-              <a:buAutoNum type="arabicPeriod"/>
-            </a:pPr>
-            <a:r>
-              <a:rPr lang="en-US" dirty="0" smtClean="0"/>
-              <a:t>MightyMooC sends GET request to course providers </a:t>
-            </a:r>
-            <a:endParaRPr lang="en-US" dirty="0"/>
-          </a:p>
-          <a:p>
-            <a:pPr marL="342900" indent="-342900">
-              <a:buFont typeface="+mj-lt"/>
-              <a:buAutoNum type="arabicPeriod"/>
-            </a:pPr>
-            <a:r>
-              <a:rPr lang="en-US" dirty="0" smtClean="0"/>
-              <a:t>Course providers send POST with names of courses they provider in subject ‘x’</a:t>
-            </a:r>
-          </a:p>
-          <a:p>
-            <a:pPr marL="342900" indent="-342900">
-              <a:buFont typeface="+mj-lt"/>
-              <a:buAutoNum type="arabicPeriod"/>
-            </a:pPr>
-            <a:r>
-              <a:rPr lang="en-US" dirty="0" smtClean="0"/>
-              <a:t>MightyMooC POSTs the results back to the client</a:t>
-            </a:r>
-          </a:p>
-        </p:txBody>
-      </p:sp>
-      <p:cxnSp>
-        <p:nvCxnSpPr>
-          <p:cNvPr id="70" name="Elbow Connector 69"/>
-          <p:cNvCxnSpPr>
-            <a:stCxn id="12" idx="3"/>
-            <a:endCxn id="13" idx="1"/>
-          </p:cNvCxnSpPr>
-          <p:nvPr/>
-        </p:nvCxnSpPr>
-        <p:spPr>
-          <a:xfrm flipV="1">
-            <a:off x="7747569" y="1104901"/>
-            <a:ext cx="1760426" cy="1453238"/>
-          </a:xfrm>
-          <a:prstGeom prst="bentConnector3">
-            <a:avLst/>
-          </a:prstGeom>
-          <a:ln>
-            <a:headEnd type="triangle"/>
-            <a:tailEnd type="triangle"/>
-          </a:ln>
+          <a:gradFill>
+            <a:gsLst>
+              <a:gs pos="0">
+                <a:schemeClr val="accent1">
+                  <a:lumMod val="5000"/>
+                  <a:lumOff val="95000"/>
+                </a:schemeClr>
+              </a:gs>
+              <a:gs pos="74000">
+                <a:schemeClr val="accent1">
+                  <a:lumMod val="45000"/>
+                  <a:lumOff val="55000"/>
+                </a:schemeClr>
+              </a:gs>
+              <a:gs pos="83000">
+                <a:schemeClr val="accent1">
+                  <a:lumMod val="45000"/>
+                  <a:lumOff val="55000"/>
+                </a:schemeClr>
+              </a:gs>
+              <a:gs pos="100000">
+                <a:schemeClr val="accent1">
+                  <a:lumMod val="30000"/>
+                  <a:lumOff val="70000"/>
+                </a:schemeClr>
+              </a:gs>
+            </a:gsLst>
+            <a:lin ang="5400000" scaled="1"/>
+          </a:gradFill>
         </p:spPr>
         <p:style>
-          <a:lnRef idx="1">
-            <a:schemeClr val="accent1"/>
+          <a:lnRef idx="2">
+            <a:schemeClr val="accent1">
+              <a:shade val="50000"/>
+            </a:schemeClr>
           </a:lnRef>
-          <a:fillRef idx="0">
+          <a:fillRef idx="1">
             <a:schemeClr val="accent1"/>
           </a:fillRef>
           <a:effectRef idx="0">
             <a:schemeClr val="accent1"/>
           </a:effectRef>
           <a:fontRef idx="minor">
-            <a:schemeClr val="tx1"/>
+            <a:schemeClr val="lt1"/>
           </a:fontRef>
         </p:style>
-      </p:cxnSp>
-      <p:cxnSp>
-        <p:nvCxnSpPr>
-          <p:cNvPr id="72" name="Elbow Connector 71"/>
-          <p:cNvCxnSpPr>
-            <a:stCxn id="12" idx="3"/>
-            <a:endCxn id="53" idx="1"/>
-          </p:cNvCxnSpPr>
-          <p:nvPr/>
-        </p:nvCxnSpPr>
-        <p:spPr>
-          <a:xfrm>
-            <a:off x="7747569" y="2558139"/>
-            <a:ext cx="1771312" cy="3102435"/>
-          </a:xfrm>
-          <a:prstGeom prst="bentConnector3">
-            <a:avLst/>
-          </a:prstGeom>
-          <a:ln>
-            <a:headEnd type="triangle"/>
-            <a:tailEnd type="triangle"/>
-          </a:ln>
-        </p:spPr>
-        <p:style>
-          <a:lnRef idx="1">
-            <a:schemeClr val="accent1"/>
-          </a:lnRef>
-          <a:fillRef idx="0">
-            <a:schemeClr val="accent1"/>
-          </a:fillRef>
-          <a:effectRef idx="0">
-            <a:schemeClr val="accent1"/>
-          </a:effectRef>
-          <a:fontRef idx="minor">
-            <a:schemeClr val="tx1"/>
-          </a:fontRef>
-        </p:style>
-      </p:cxnSp>
-      <p:cxnSp>
-        <p:nvCxnSpPr>
-          <p:cNvPr id="74" name="Straight Arrow Connector 73"/>
-          <p:cNvCxnSpPr>
-            <a:stCxn id="12" idx="3"/>
-            <a:endCxn id="35" idx="1"/>
-          </p:cNvCxnSpPr>
-          <p:nvPr/>
-        </p:nvCxnSpPr>
-        <p:spPr>
-          <a:xfrm>
-            <a:off x="7747569" y="2558139"/>
-            <a:ext cx="1760426" cy="4"/>
-          </a:xfrm>
-          <a:prstGeom prst="straightConnector1">
-            <a:avLst/>
-          </a:prstGeom>
-          <a:ln>
-            <a:headEnd type="triangle"/>
-            <a:tailEnd type="triangle"/>
-          </a:ln>
-        </p:spPr>
-        <p:style>
-          <a:lnRef idx="1">
-            <a:schemeClr val="accent1"/>
-          </a:lnRef>
-          <a:fillRef idx="0">
-            <a:schemeClr val="accent1"/>
-          </a:fillRef>
-          <a:effectRef idx="0">
-            <a:schemeClr val="accent1"/>
-          </a:effectRef>
-          <a:fontRef idx="minor">
-            <a:schemeClr val="tx1"/>
-          </a:fontRef>
-        </p:style>
-      </p:cxnSp>
-      <p:cxnSp>
-        <p:nvCxnSpPr>
-          <p:cNvPr id="78" name="Elbow Connector 77"/>
-          <p:cNvCxnSpPr>
-            <a:stCxn id="12" idx="3"/>
-            <a:endCxn id="37" idx="1"/>
-          </p:cNvCxnSpPr>
-          <p:nvPr/>
-        </p:nvCxnSpPr>
-        <p:spPr>
-          <a:xfrm>
-            <a:off x="7747569" y="2558139"/>
-            <a:ext cx="1740018" cy="1502229"/>
-          </a:xfrm>
-          <a:prstGeom prst="bentConnector3">
-            <a:avLst>
-              <a:gd name="adj1" fmla="val 50626"/>
-            </a:avLst>
-          </a:prstGeom>
-          <a:ln>
-            <a:headEnd type="triangle"/>
-            <a:tailEnd type="triangle"/>
-          </a:ln>
-        </p:spPr>
-        <p:style>
-          <a:lnRef idx="1">
-            <a:schemeClr val="accent1"/>
-          </a:lnRef>
-          <a:fillRef idx="0">
-            <a:schemeClr val="accent1"/>
-          </a:fillRef>
-          <a:effectRef idx="0">
-            <a:schemeClr val="accent1"/>
-          </a:effectRef>
-          <a:fontRef idx="minor">
-            <a:schemeClr val="tx1"/>
-          </a:fontRef>
-        </p:style>
-      </p:cxnSp>
-      <p:cxnSp>
-        <p:nvCxnSpPr>
-          <p:cNvPr id="82" name="Straight Arrow Connector 81"/>
-          <p:cNvCxnSpPr>
-            <a:stCxn id="39" idx="3"/>
-            <a:endCxn id="12" idx="1"/>
-          </p:cNvCxnSpPr>
-          <p:nvPr/>
-        </p:nvCxnSpPr>
-        <p:spPr>
-          <a:xfrm>
-            <a:off x="4245429" y="2558139"/>
-            <a:ext cx="1760426" cy="0"/>
-          </a:xfrm>
-          <a:prstGeom prst="straightConnector1">
-            <a:avLst/>
-          </a:prstGeom>
-          <a:ln>
-            <a:headEnd type="triangle"/>
-            <a:tailEnd type="triangle"/>
-          </a:ln>
-        </p:spPr>
-        <p:style>
-          <a:lnRef idx="1">
-            <a:schemeClr val="accent1"/>
-          </a:lnRef>
-          <a:fillRef idx="0">
-            <a:schemeClr val="accent1"/>
-          </a:fillRef>
-          <a:effectRef idx="0">
-            <a:schemeClr val="accent1"/>
-          </a:effectRef>
-          <a:fontRef idx="minor">
-            <a:schemeClr val="tx1"/>
-          </a:fontRef>
-        </p:style>
-      </p:cxnSp>
-      <p:sp>
-        <p:nvSpPr>
-          <p:cNvPr id="84" name="TextBox 83"/>
-          <p:cNvSpPr txBox="1"/>
-          <p:nvPr/>
-        </p:nvSpPr>
-        <p:spPr>
-          <a:xfrm>
-            <a:off x="5772403" y="2188806"/>
-            <a:ext cx="301686" cy="369332"/>
-          </a:xfrm>
-          <a:prstGeom prst="rect">
-            <a:avLst/>
-          </a:prstGeom>
-          <a:noFill/>
-        </p:spPr>
-        <p:txBody>
-          <a:bodyPr wrap="none" rtlCol="0">
-            <a:spAutoFit/>
-          </a:bodyPr>
-          <a:lstStyle/>
-          <a:p>
-            <a:r>
-              <a:rPr lang="en-US" smtClean="0"/>
-              <a:t>1</a:t>
-            </a:r>
-            <a:endParaRPr lang="en-US"/>
-          </a:p>
-        </p:txBody>
-      </p:sp>
-      <p:sp>
-        <p:nvSpPr>
-          <p:cNvPr id="85" name="TextBox 84"/>
-          <p:cNvSpPr txBox="1"/>
-          <p:nvPr/>
-        </p:nvSpPr>
-        <p:spPr>
-          <a:xfrm>
-            <a:off x="9229644" y="749563"/>
-            <a:ext cx="301686" cy="369332"/>
-          </a:xfrm>
-          <a:prstGeom prst="rect">
-            <a:avLst/>
-          </a:prstGeom>
-          <a:noFill/>
-        </p:spPr>
-        <p:txBody>
-          <a:bodyPr wrap="none" rtlCol="0">
-            <a:spAutoFit/>
-          </a:bodyPr>
-          <a:lstStyle/>
-          <a:p>
-            <a:r>
-              <a:rPr lang="en-US" smtClean="0"/>
-              <a:t>2</a:t>
-            </a:r>
-            <a:endParaRPr lang="en-US"/>
-          </a:p>
-        </p:txBody>
-      </p:sp>
-      <p:sp>
-        <p:nvSpPr>
-          <p:cNvPr id="86" name="TextBox 85"/>
-          <p:cNvSpPr txBox="1"/>
-          <p:nvPr/>
-        </p:nvSpPr>
-        <p:spPr>
-          <a:xfrm>
-            <a:off x="9265354" y="2224579"/>
-            <a:ext cx="301686" cy="369332"/>
-          </a:xfrm>
-          <a:prstGeom prst="rect">
-            <a:avLst/>
-          </a:prstGeom>
-          <a:noFill/>
-        </p:spPr>
-        <p:txBody>
-          <a:bodyPr wrap="none" rtlCol="0">
-            <a:spAutoFit/>
-          </a:bodyPr>
-          <a:lstStyle/>
-          <a:p>
-            <a:r>
-              <a:rPr lang="en-US" dirty="0" smtClean="0"/>
-              <a:t>2</a:t>
-            </a:r>
-            <a:endParaRPr lang="en-US" dirty="0"/>
-          </a:p>
-        </p:txBody>
-      </p:sp>
-      <p:sp>
-        <p:nvSpPr>
-          <p:cNvPr id="87" name="TextBox 86"/>
-          <p:cNvSpPr txBox="1"/>
-          <p:nvPr/>
-        </p:nvSpPr>
-        <p:spPr>
-          <a:xfrm>
-            <a:off x="9276113" y="3728368"/>
-            <a:ext cx="301686" cy="369332"/>
-          </a:xfrm>
-          <a:prstGeom prst="rect">
-            <a:avLst/>
-          </a:prstGeom>
-          <a:noFill/>
-        </p:spPr>
-        <p:txBody>
-          <a:bodyPr wrap="none" rtlCol="0">
-            <a:spAutoFit/>
-          </a:bodyPr>
-          <a:lstStyle/>
-          <a:p>
-            <a:r>
-              <a:rPr lang="en-US" smtClean="0"/>
-              <a:t>2</a:t>
-            </a:r>
-            <a:endParaRPr lang="en-US"/>
-          </a:p>
-        </p:txBody>
-      </p:sp>
-      <p:sp>
-        <p:nvSpPr>
-          <p:cNvPr id="88" name="TextBox 87"/>
-          <p:cNvSpPr txBox="1"/>
-          <p:nvPr/>
-        </p:nvSpPr>
-        <p:spPr>
-          <a:xfrm>
-            <a:off x="9290879" y="5322139"/>
-            <a:ext cx="301686" cy="369332"/>
-          </a:xfrm>
-          <a:prstGeom prst="rect">
-            <a:avLst/>
-          </a:prstGeom>
-          <a:noFill/>
-        </p:spPr>
-        <p:txBody>
-          <a:bodyPr wrap="none" rtlCol="0">
-            <a:spAutoFit/>
-          </a:bodyPr>
-          <a:lstStyle/>
-          <a:p>
-            <a:r>
-              <a:rPr lang="en-US" smtClean="0"/>
-              <a:t>2</a:t>
-            </a:r>
-            <a:endParaRPr lang="en-US"/>
-          </a:p>
-        </p:txBody>
-      </p:sp>
-      <p:sp>
-        <p:nvSpPr>
-          <p:cNvPr id="90" name="TextBox 89"/>
-          <p:cNvSpPr txBox="1"/>
-          <p:nvPr/>
-        </p:nvSpPr>
-        <p:spPr>
-          <a:xfrm>
-            <a:off x="7715599" y="2206693"/>
-            <a:ext cx="301686" cy="369332"/>
-          </a:xfrm>
-          <a:prstGeom prst="rect">
-            <a:avLst/>
-          </a:prstGeom>
-          <a:noFill/>
-        </p:spPr>
-        <p:txBody>
-          <a:bodyPr wrap="none" rtlCol="0">
-            <a:spAutoFit/>
-          </a:bodyPr>
-          <a:lstStyle/>
-          <a:p>
-            <a:r>
-              <a:rPr lang="en-US" dirty="0"/>
-              <a:t>3</a:t>
-            </a:r>
-          </a:p>
-        </p:txBody>
-      </p:sp>
-      <p:sp>
-        <p:nvSpPr>
-          <p:cNvPr id="91" name="TextBox 90"/>
-          <p:cNvSpPr txBox="1"/>
-          <p:nvPr/>
-        </p:nvSpPr>
-        <p:spPr>
-          <a:xfrm>
-            <a:off x="4222094" y="2206693"/>
-            <a:ext cx="301686" cy="369332"/>
-          </a:xfrm>
-          <a:prstGeom prst="rect">
-            <a:avLst/>
-          </a:prstGeom>
-          <a:noFill/>
-        </p:spPr>
-        <p:txBody>
-          <a:bodyPr wrap="none" rtlCol="0">
-            <a:spAutoFit/>
-          </a:bodyPr>
-          <a:lstStyle/>
-          <a:p>
-            <a:r>
-              <a:rPr lang="en-US" dirty="0"/>
-              <a:t>4</a:t>
-            </a:r>
-            <a:endParaRPr lang="en-US" dirty="0" smtClean="0"/>
+        <p:txBody>
+          <a:bodyPr rtlCol="0" anchor="ctr"/>
+          <a:lstStyle/>
+          <a:p>
+            <a:pPr algn="ctr"/>
+            <a:r>
+              <a:rPr lang="en-US" sz="1400" dirty="0" smtClean="0">
+                <a:solidFill>
+                  <a:schemeClr val="tx1"/>
+                </a:solidFill>
+              </a:rPr>
+              <a:t>MightyMooC </a:t>
+            </a:r>
+          </a:p>
+          <a:p>
+            <a:pPr algn="ctr"/>
+            <a:r>
+              <a:rPr lang="en-US" sz="1400" smtClean="0">
+                <a:solidFill>
+                  <a:schemeClr val="tx1"/>
+                </a:solidFill>
+              </a:rPr>
+              <a:t>UploadService</a:t>
+            </a:r>
+            <a:endParaRPr lang="en-US" sz="1400" dirty="0">
+              <a:solidFill>
+                <a:schemeClr val="tx1"/>
+              </a:solidFill>
+            </a:endParaRPr>
           </a:p>
         </p:txBody>
       </p:sp>

</xml_diff>